<commit_message>
Little change added i n diagram
</commit_message>
<xml_diff>
--- a/report/Bdms-diagrams.pptx
+++ b/report/Bdms-diagrams.pptx
@@ -11784,9 +11784,10 @@
           <a:p>
             <a:pPr algn="ctr"/>
             <a:r>
-              <a:rPr lang="en-US" sz="1200" b="1" dirty="0"/>
-              <a:t>3.2</a:t>
-            </a:r>
+              <a:rPr lang="en-US" sz="1200" b="1" dirty="0" smtClean="0"/>
+              <a:t>1.3</a:t>
+            </a:r>
+            <a:endParaRPr lang="en-US" sz="1200" b="1" dirty="0"/>
           </a:p>
         </p:txBody>
       </p:sp>
@@ -11837,9 +11838,10 @@
           <a:p>
             <a:pPr algn="ctr"/>
             <a:r>
-              <a:rPr lang="en-US" sz="1200" b="1" dirty="0"/>
-              <a:t>3.3</a:t>
-            </a:r>
+              <a:rPr lang="en-US" sz="1200" b="1" dirty="0" smtClean="0"/>
+              <a:t>1.2</a:t>
+            </a:r>
+            <a:endParaRPr lang="en-US" sz="1200" b="1" dirty="0"/>
           </a:p>
         </p:txBody>
       </p:sp>
@@ -12601,6 +12603,36 @@
               <a:rPr lang="en-US" sz="1000"/>
               <a:t>Backup Info</a:t>
             </a:r>
+          </a:p>
+        </p:txBody>
+      </p:sp>
+      <p:sp>
+        <p:nvSpPr>
+          <p:cNvPr id="27" name="TextBox 26"/>
+          <p:cNvSpPr txBox="1"/>
+          <p:nvPr/>
+        </p:nvSpPr>
+        <p:spPr>
+          <a:xfrm>
+            <a:off x="3505200" y="2819400"/>
+            <a:ext cx="609600" cy="369332"/>
+          </a:xfrm>
+          <a:prstGeom prst="rect">
+            <a:avLst/>
+          </a:prstGeom>
+          <a:noFill/>
+        </p:spPr>
+        <p:txBody>
+          <a:bodyPr wrap="square" rtlCol="0">
+            <a:spAutoFit/>
+          </a:bodyPr>
+          <a:lstStyle/>
+          <a:p>
+            <a:r>
+              <a:rPr lang="en-US" dirty="0" smtClean="0"/>
+              <a:t>1.1</a:t>
+            </a:r>
+            <a:endParaRPr lang="en-US" dirty="0"/>
           </a:p>
         </p:txBody>
       </p:sp>

</xml_diff>